<commit_message>
flatmap and  lift method example
</commit_message>
<xml_diff>
--- a/RxJava 简介.pptx
+++ b/RxJava 简介.pptx
@@ -8,13 +8,17 @@
     <p:sldId id="256" r:id="rId2"/>
     <p:sldId id="257" r:id="rId3"/>
     <p:sldId id="258" r:id="rId4"/>
-    <p:sldId id="259" r:id="rId5"/>
-    <p:sldId id="261" r:id="rId6"/>
-    <p:sldId id="262" r:id="rId7"/>
-    <p:sldId id="264" r:id="rId8"/>
-    <p:sldId id="260" r:id="rId9"/>
-    <p:sldId id="265" r:id="rId10"/>
-    <p:sldId id="263" r:id="rId11"/>
+    <p:sldId id="267" r:id="rId5"/>
+    <p:sldId id="259" r:id="rId6"/>
+    <p:sldId id="261" r:id="rId7"/>
+    <p:sldId id="262" r:id="rId8"/>
+    <p:sldId id="264" r:id="rId9"/>
+    <p:sldId id="260" r:id="rId10"/>
+    <p:sldId id="265" r:id="rId11"/>
+    <p:sldId id="266" r:id="rId12"/>
+    <p:sldId id="269" r:id="rId13"/>
+    <p:sldId id="263" r:id="rId14"/>
+    <p:sldId id="268" r:id="rId15"/>
   </p:sldIdLst>
   <p:sldSz cx="9144000" cy="6858000" type="screen4x3"/>
   <p:notesSz cx="6858000" cy="9144000"/>
@@ -297,7 +301,7 @@
           <a:p>
             <a:fld id="{D0E98132-6635-4FE6-9F6A-E6B8D391A6C7}" type="datetimeFigureOut">
               <a:rPr lang="zh-CN" altLang="en-US" smtClean="0"/>
-              <a:t>2016/1/3</a:t>
+              <a:t>2016/1/5</a:t>
             </a:fld>
             <a:endParaRPr lang="zh-CN" altLang="en-US"/>
           </a:p>
@@ -467,7 +471,7 @@
           <a:p>
             <a:fld id="{D0E98132-6635-4FE6-9F6A-E6B8D391A6C7}" type="datetimeFigureOut">
               <a:rPr lang="zh-CN" altLang="en-US" smtClean="0"/>
-              <a:t>2016/1/3</a:t>
+              <a:t>2016/1/5</a:t>
             </a:fld>
             <a:endParaRPr lang="zh-CN" altLang="en-US"/>
           </a:p>
@@ -647,7 +651,7 @@
           <a:p>
             <a:fld id="{D0E98132-6635-4FE6-9F6A-E6B8D391A6C7}" type="datetimeFigureOut">
               <a:rPr lang="zh-CN" altLang="en-US" smtClean="0"/>
-              <a:t>2016/1/3</a:t>
+              <a:t>2016/1/5</a:t>
             </a:fld>
             <a:endParaRPr lang="zh-CN" altLang="en-US"/>
           </a:p>
@@ -817,7 +821,7 @@
           <a:p>
             <a:fld id="{D0E98132-6635-4FE6-9F6A-E6B8D391A6C7}" type="datetimeFigureOut">
               <a:rPr lang="zh-CN" altLang="en-US" smtClean="0"/>
-              <a:t>2016/1/3</a:t>
+              <a:t>2016/1/5</a:t>
             </a:fld>
             <a:endParaRPr lang="zh-CN" altLang="en-US"/>
           </a:p>
@@ -1063,7 +1067,7 @@
           <a:p>
             <a:fld id="{D0E98132-6635-4FE6-9F6A-E6B8D391A6C7}" type="datetimeFigureOut">
               <a:rPr lang="zh-CN" altLang="en-US" smtClean="0"/>
-              <a:t>2016/1/3</a:t>
+              <a:t>2016/1/5</a:t>
             </a:fld>
             <a:endParaRPr lang="zh-CN" altLang="en-US"/>
           </a:p>
@@ -1351,7 +1355,7 @@
           <a:p>
             <a:fld id="{D0E98132-6635-4FE6-9F6A-E6B8D391A6C7}" type="datetimeFigureOut">
               <a:rPr lang="zh-CN" altLang="en-US" smtClean="0"/>
-              <a:t>2016/1/3</a:t>
+              <a:t>2016/1/5</a:t>
             </a:fld>
             <a:endParaRPr lang="zh-CN" altLang="en-US"/>
           </a:p>
@@ -1773,7 +1777,7 @@
           <a:p>
             <a:fld id="{D0E98132-6635-4FE6-9F6A-E6B8D391A6C7}" type="datetimeFigureOut">
               <a:rPr lang="zh-CN" altLang="en-US" smtClean="0"/>
-              <a:t>2016/1/3</a:t>
+              <a:t>2016/1/5</a:t>
             </a:fld>
             <a:endParaRPr lang="zh-CN" altLang="en-US"/>
           </a:p>
@@ -1891,7 +1895,7 @@
           <a:p>
             <a:fld id="{D0E98132-6635-4FE6-9F6A-E6B8D391A6C7}" type="datetimeFigureOut">
               <a:rPr lang="zh-CN" altLang="en-US" smtClean="0"/>
-              <a:t>2016/1/3</a:t>
+              <a:t>2016/1/5</a:t>
             </a:fld>
             <a:endParaRPr lang="zh-CN" altLang="en-US"/>
           </a:p>
@@ -1986,7 +1990,7 @@
           <a:p>
             <a:fld id="{D0E98132-6635-4FE6-9F6A-E6B8D391A6C7}" type="datetimeFigureOut">
               <a:rPr lang="zh-CN" altLang="en-US" smtClean="0"/>
-              <a:t>2016/1/3</a:t>
+              <a:t>2016/1/5</a:t>
             </a:fld>
             <a:endParaRPr lang="zh-CN" altLang="en-US"/>
           </a:p>
@@ -2263,7 +2267,7 @@
           <a:p>
             <a:fld id="{D0E98132-6635-4FE6-9F6A-E6B8D391A6C7}" type="datetimeFigureOut">
               <a:rPr lang="zh-CN" altLang="en-US" smtClean="0"/>
-              <a:t>2016/1/3</a:t>
+              <a:t>2016/1/5</a:t>
             </a:fld>
             <a:endParaRPr lang="zh-CN" altLang="en-US"/>
           </a:p>
@@ -2516,7 +2520,7 @@
           <a:p>
             <a:fld id="{D0E98132-6635-4FE6-9F6A-E6B8D391A6C7}" type="datetimeFigureOut">
               <a:rPr lang="zh-CN" altLang="en-US" smtClean="0"/>
-              <a:t>2016/1/3</a:t>
+              <a:t>2016/1/5</a:t>
             </a:fld>
             <a:endParaRPr lang="zh-CN" altLang="en-US"/>
           </a:p>
@@ -2729,7 +2733,7 @@
           <a:p>
             <a:fld id="{D0E98132-6635-4FE6-9F6A-E6B8D391A6C7}" type="datetimeFigureOut">
               <a:rPr lang="zh-CN" altLang="en-US" smtClean="0"/>
-              <a:t>2016/1/3</a:t>
+              <a:t>2016/1/5</a:t>
             </a:fld>
             <a:endParaRPr lang="zh-CN" altLang="en-US"/>
           </a:p>
@@ -3214,16 +3218,12 @@
           <a:lstStyle/>
           <a:p>
             <a:r>
+              <a:rPr lang="en-US" altLang="zh-CN" dirty="0" smtClean="0"/>
+              <a:t>Scheduler</a:t>
+            </a:r>
+            <a:r>
               <a:rPr lang="zh-CN" altLang="en-US" dirty="0" smtClean="0"/>
-              <a:t>附录 </a:t>
-            </a:r>
-            <a:r>
-              <a:rPr lang="en-US" altLang="zh-CN" dirty="0" smtClean="0"/>
-              <a:t>– </a:t>
-            </a:r>
-            <a:r>
-              <a:rPr lang="zh-CN" altLang="en-US" dirty="0" smtClean="0"/>
-              <a:t>疑问点</a:t>
+              <a:t>的原理</a:t>
             </a:r>
             <a:endParaRPr lang="zh-CN" altLang="en-US" dirty="0"/>
           </a:p>
@@ -3247,108 +3247,30 @@
           <a:lstStyle/>
           <a:p>
             <a:r>
-              <a:rPr lang="en-US" altLang="zh-CN" sz="2400" dirty="0"/>
-              <a:t>subscribe() </a:t>
-            </a:r>
-            <a:r>
-              <a:rPr lang="zh-CN" altLang="en-US" sz="2400" dirty="0"/>
-              <a:t>这个方法有点怪：它看起来是</a:t>
-            </a:r>
-            <a:r>
-              <a:rPr lang="en-US" altLang="zh-CN" sz="2400" dirty="0"/>
-              <a:t>『</a:t>
-            </a:r>
-            <a:r>
-              <a:rPr lang="en-US" altLang="zh-CN" sz="2400" dirty="0" err="1"/>
-              <a:t>observalbe</a:t>
-            </a:r>
-            <a:r>
-              <a:rPr lang="en-US" altLang="zh-CN" sz="2400" dirty="0"/>
-              <a:t> </a:t>
-            </a:r>
-            <a:r>
-              <a:rPr lang="zh-CN" altLang="en-US" sz="2400" dirty="0"/>
-              <a:t>订阅了 </a:t>
-            </a:r>
-            <a:r>
-              <a:rPr lang="en-US" altLang="zh-CN" sz="2400" dirty="0"/>
-              <a:t>observer / subscriber』</a:t>
-            </a:r>
-            <a:r>
-              <a:rPr lang="zh-CN" altLang="en-US" sz="2400" dirty="0"/>
-              <a:t>而不是</a:t>
-            </a:r>
-            <a:r>
-              <a:rPr lang="en-US" altLang="zh-CN" sz="2400" dirty="0"/>
-              <a:t>『observer / subscriber </a:t>
-            </a:r>
-            <a:r>
-              <a:rPr lang="zh-CN" altLang="en-US" sz="2400" dirty="0"/>
-              <a:t>订阅了 </a:t>
-            </a:r>
-            <a:r>
-              <a:rPr lang="en-US" altLang="zh-CN" sz="2400" dirty="0" err="1"/>
-              <a:t>observalbe</a:t>
-            </a:r>
-            <a:r>
-              <a:rPr lang="en-US" altLang="zh-CN" sz="2400" dirty="0"/>
-              <a:t>』</a:t>
-            </a:r>
-            <a:r>
-              <a:rPr lang="zh-CN" altLang="en-US" sz="2400" dirty="0"/>
-              <a:t>，这看起来就像</a:t>
-            </a:r>
-            <a:r>
-              <a:rPr lang="en-US" altLang="zh-CN" sz="2400" dirty="0"/>
-              <a:t>『</a:t>
-            </a:r>
-            <a:r>
-              <a:rPr lang="zh-CN" altLang="en-US" sz="2400" dirty="0"/>
-              <a:t>杂志订阅了读者</a:t>
-            </a:r>
-            <a:r>
-              <a:rPr lang="en-US" altLang="zh-CN" sz="2400" dirty="0"/>
-              <a:t>』</a:t>
-            </a:r>
-            <a:r>
-              <a:rPr lang="zh-CN" altLang="en-US" sz="2400" dirty="0"/>
-              <a:t>一样颠倒了对象关系。这让人读起来有点别扭，不过如果把 </a:t>
-            </a:r>
-            <a:r>
-              <a:rPr lang="en-US" altLang="zh-CN" sz="2400" dirty="0"/>
-              <a:t>API </a:t>
-            </a:r>
-            <a:r>
-              <a:rPr lang="zh-CN" altLang="en-US" sz="2400" dirty="0"/>
-              <a:t>设计成 </a:t>
-            </a:r>
-            <a:r>
-              <a:rPr lang="en-US" altLang="zh-CN" sz="2400" dirty="0" err="1"/>
-              <a:t>observer.subscribe</a:t>
-            </a:r>
-            <a:r>
-              <a:rPr lang="en-US" altLang="zh-CN" sz="2400" dirty="0"/>
-              <a:t>(observable) / </a:t>
-            </a:r>
-            <a:r>
-              <a:rPr lang="en-US" altLang="zh-CN" sz="2400" dirty="0" err="1"/>
-              <a:t>subscriber.subscribe</a:t>
-            </a:r>
-            <a:r>
-              <a:rPr lang="en-US" altLang="zh-CN" sz="2400" dirty="0"/>
-              <a:t>(observable) </a:t>
-            </a:r>
-            <a:r>
-              <a:rPr lang="zh-CN" altLang="en-US" sz="2400" dirty="0"/>
-              <a:t>，虽然更加符合思维逻辑，但对流式 </a:t>
-            </a:r>
-            <a:r>
-              <a:rPr lang="en-US" altLang="zh-CN" sz="2400" dirty="0"/>
-              <a:t>API </a:t>
-            </a:r>
-            <a:r>
-              <a:rPr lang="zh-CN" altLang="en-US" sz="2400" dirty="0"/>
-              <a:t>的设计就造成影响了，比较起来明显是得不偿失的</a:t>
+              <a:rPr lang="zh-CN" altLang="en-US" dirty="0" smtClean="0"/>
+              <a:t>一、变换</a:t>
+            </a:r>
+            <a:endParaRPr lang="en-US" altLang="zh-CN" dirty="0" smtClean="0"/>
+          </a:p>
+          <a:p>
+            <a:pPr marL="0" indent="0">
+              <a:buNone/>
+            </a:pPr>
+            <a:r>
+              <a:rPr lang="en-US" altLang="zh-CN" dirty="0"/>
+              <a:t> </a:t>
+            </a:r>
+            <a:r>
+              <a:rPr lang="en-US" altLang="zh-CN" dirty="0" smtClean="0"/>
+              <a:t>  </a:t>
+            </a:r>
+            <a:r>
+              <a:rPr lang="en-US" altLang="zh-CN" sz="2400" dirty="0" smtClean="0"/>
+              <a:t> </a:t>
+            </a:r>
+            <a:r>
+              <a:rPr lang="zh-CN" altLang="en-US" sz="2400" dirty="0" smtClean="0"/>
+              <a:t>将事件序列中的对象或整个事件序列进行加工处理，转换成不同是对象或事件序列</a:t>
             </a:r>
             <a:r>
               <a:rPr lang="zh-CN" altLang="en-US" sz="2400" dirty="0" smtClean="0"/>
@@ -3357,37 +3279,783 @@
             <a:endParaRPr lang="en-US" altLang="zh-CN" sz="2400" dirty="0" smtClean="0"/>
           </a:p>
           <a:p>
-            <a:r>
-              <a:rPr lang="en-US" altLang="zh-CN" sz="2400" dirty="0" err="1" smtClean="0"/>
+            <a:pPr marL="0" indent="0">
+              <a:buNone/>
+            </a:pPr>
+            <a:endParaRPr lang="en-US" altLang="zh-CN" sz="2400" dirty="0"/>
+          </a:p>
+          <a:p>
+            <a:pPr marL="0" indent="0">
+              <a:buNone/>
+            </a:pPr>
+            <a:r>
+              <a:rPr lang="en-US" altLang="zh-CN" sz="2000" dirty="0" smtClean="0"/>
+              <a:t>1</a:t>
+            </a:r>
+            <a:r>
+              <a:rPr lang="zh-CN" altLang="en-US" sz="2000" dirty="0" smtClean="0"/>
+              <a:t>、</a:t>
+            </a:r>
+            <a:r>
+              <a:rPr lang="en-US" altLang="zh-CN" sz="2000" dirty="0" smtClean="0"/>
+              <a:t>map</a:t>
+            </a:r>
+          </a:p>
+          <a:p>
+            <a:pPr marL="0" indent="0">
+              <a:buNone/>
+            </a:pPr>
+            <a:r>
+              <a:rPr lang="en-US" altLang="zh-CN" sz="2000" dirty="0"/>
+              <a:t> </a:t>
+            </a:r>
+            <a:r>
+              <a:rPr lang="en-US" altLang="zh-CN" sz="2000" dirty="0" smtClean="0"/>
+              <a:t>     </a:t>
+            </a:r>
+            <a:r>
+              <a:rPr lang="zh-CN" altLang="en-US" sz="2000" dirty="0" smtClean="0"/>
+              <a:t>一对一的变换，最简单的变化。</a:t>
+            </a:r>
+            <a:r>
+              <a:rPr lang="en-US" altLang="zh-CN" sz="2000" dirty="0" smtClean="0"/>
+              <a:t>Map()</a:t>
+            </a:r>
+            <a:r>
+              <a:rPr lang="zh-CN" altLang="en-US" sz="2000" dirty="0" smtClean="0"/>
+              <a:t>示意图如图</a:t>
+            </a:r>
+            <a:r>
+              <a:rPr lang="en-US" altLang="zh-CN" sz="2000" dirty="0" smtClean="0"/>
+              <a:t>1-1</a:t>
+            </a:r>
+            <a:r>
+              <a:rPr lang="zh-CN" altLang="en-US" sz="2000" dirty="0" smtClean="0"/>
+              <a:t>：</a:t>
+            </a:r>
+            <a:endParaRPr lang="en-US" altLang="zh-CN" sz="2000" dirty="0" smtClean="0"/>
+          </a:p>
+          <a:p>
+            <a:pPr marL="0" indent="0">
+              <a:buNone/>
+            </a:pPr>
+            <a:endParaRPr lang="en-US" altLang="zh-CN" sz="2400" dirty="0" smtClean="0"/>
+          </a:p>
+        </p:txBody>
+      </p:sp>
+    </p:spTree>
+    <p:extLst>
+      <p:ext uri="{BB962C8B-B14F-4D97-AF65-F5344CB8AC3E}">
+        <p14:creationId xmlns:p14="http://schemas.microsoft.com/office/powerpoint/2010/main" val="2507018378"/>
+      </p:ext>
+    </p:extLst>
+  </p:cSld>
+  <p:clrMapOvr>
+    <a:masterClrMapping/>
+  </p:clrMapOvr>
+  <p:timing>
+    <p:tnLst>
+      <p:par>
+        <p:cTn id="1" dur="indefinite" restart="never" nodeType="tmRoot"/>
+      </p:par>
+    </p:tnLst>
+  </p:timing>
+</p:sld>
+</file>
+
+<file path=ppt/slides/slide11.xml><?xml version="1.0" encoding="utf-8"?>
+<p:sld xmlns:a="http://schemas.openxmlformats.org/drawingml/2006/main" xmlns:r="http://schemas.openxmlformats.org/officeDocument/2006/relationships" xmlns:p="http://schemas.openxmlformats.org/presentationml/2006/main">
+  <p:cSld>
+    <p:spTree>
+      <p:nvGrpSpPr>
+        <p:cNvPr id="1" name=""/>
+        <p:cNvGrpSpPr/>
+        <p:nvPr/>
+      </p:nvGrpSpPr>
+      <p:grpSpPr>
+        <a:xfrm>
+          <a:off x="0" y="0"/>
+          <a:ext cx="0" cy="0"/>
+          <a:chOff x="0" y="0"/>
+          <a:chExt cx="0" cy="0"/>
+        </a:xfrm>
+      </p:grpSpPr>
+      <p:pic>
+        <p:nvPicPr>
+          <p:cNvPr id="4" name="图片 3"/>
+          <p:cNvPicPr>
+            <a:picLocks noChangeAspect="1"/>
+          </p:cNvPicPr>
+          <p:nvPr/>
+        </p:nvPicPr>
+        <p:blipFill>
+          <a:blip r:embed="rId2">
+            <a:extLst>
+              <a:ext uri="{28A0092B-C50C-407E-A947-70E740481C1C}">
+                <a14:useLocalDpi xmlns:a14="http://schemas.microsoft.com/office/drawing/2010/main" val="0"/>
+              </a:ext>
+            </a:extLst>
+          </a:blip>
+          <a:stretch>
+            <a:fillRect/>
+          </a:stretch>
+        </p:blipFill>
+        <p:spPr>
+          <a:xfrm>
+            <a:off x="755576" y="487735"/>
+            <a:ext cx="3888432" cy="2730710"/>
+          </a:xfrm>
+          <a:prstGeom prst="rect">
+            <a:avLst/>
+          </a:prstGeom>
+        </p:spPr>
+      </p:pic>
+      <p:sp>
+        <p:nvSpPr>
+          <p:cNvPr id="5" name="TextBox 4"/>
+          <p:cNvSpPr txBox="1"/>
+          <p:nvPr/>
+        </p:nvSpPr>
+        <p:spPr>
+          <a:xfrm>
+            <a:off x="1547664" y="3242481"/>
+            <a:ext cx="1895071" cy="369332"/>
+          </a:xfrm>
+          <a:prstGeom prst="rect">
+            <a:avLst/>
+          </a:prstGeom>
+          <a:noFill/>
+        </p:spPr>
+        <p:txBody>
+          <a:bodyPr wrap="none" rtlCol="0">
+            <a:spAutoFit/>
+          </a:bodyPr>
+          <a:lstStyle/>
+          <a:p>
+            <a:r>
+              <a:rPr lang="zh-CN" altLang="en-US" dirty="0"/>
+              <a:t>图</a:t>
+            </a:r>
+            <a:r>
+              <a:rPr lang="en-US" altLang="zh-CN" dirty="0" smtClean="0"/>
+              <a:t>1-1 Map</a:t>
+            </a:r>
+            <a:r>
+              <a:rPr lang="zh-CN" altLang="en-US" dirty="0" smtClean="0"/>
+              <a:t>示意</a:t>
+            </a:r>
+            <a:r>
+              <a:rPr lang="zh-CN" altLang="en-US" dirty="0"/>
+              <a:t>图</a:t>
+            </a:r>
+            <a:endParaRPr lang="en-US" altLang="zh-CN" dirty="0" smtClean="0"/>
+          </a:p>
+        </p:txBody>
+      </p:sp>
+      <p:pic>
+        <p:nvPicPr>
+          <p:cNvPr id="6" name="图片 5"/>
+          <p:cNvPicPr>
+            <a:picLocks noChangeAspect="1"/>
+          </p:cNvPicPr>
+          <p:nvPr/>
+        </p:nvPicPr>
+        <p:blipFill>
+          <a:blip r:embed="rId3">
+            <a:extLst>
+              <a:ext uri="{28A0092B-C50C-407E-A947-70E740481C1C}">
+                <a14:useLocalDpi xmlns:a14="http://schemas.microsoft.com/office/drawing/2010/main" val="0"/>
+              </a:ext>
+            </a:extLst>
+          </a:blip>
+          <a:stretch>
+            <a:fillRect/>
+          </a:stretch>
+        </p:blipFill>
+        <p:spPr>
+          <a:xfrm>
+            <a:off x="4139952" y="3068960"/>
+            <a:ext cx="4492201" cy="3496430"/>
+          </a:xfrm>
+          <a:prstGeom prst="rect">
+            <a:avLst/>
+          </a:prstGeom>
+        </p:spPr>
+      </p:pic>
+      <p:sp>
+        <p:nvSpPr>
+          <p:cNvPr id="7" name="TextBox 6"/>
+          <p:cNvSpPr txBox="1"/>
+          <p:nvPr/>
+        </p:nvSpPr>
+        <p:spPr>
+          <a:xfrm>
+            <a:off x="5652120" y="2403108"/>
+            <a:ext cx="1718740" cy="369332"/>
+          </a:xfrm>
+          <a:prstGeom prst="rect">
+            <a:avLst/>
+          </a:prstGeom>
+          <a:noFill/>
+        </p:spPr>
+        <p:txBody>
+          <a:bodyPr wrap="none" rtlCol="0">
+            <a:spAutoFit/>
+          </a:bodyPr>
+          <a:lstStyle/>
+          <a:p>
+            <a:r>
+              <a:rPr lang="zh-CN" altLang="en-US" dirty="0" smtClean="0"/>
+              <a:t>图</a:t>
+            </a:r>
+            <a:r>
+              <a:rPr lang="en-US" altLang="zh-CN" dirty="0" smtClean="0"/>
+              <a:t>1-2 lift</a:t>
+            </a:r>
+            <a:r>
+              <a:rPr lang="zh-CN" altLang="en-US" dirty="0" smtClean="0"/>
+              <a:t>原理图</a:t>
+            </a:r>
+            <a:endParaRPr lang="en-US" altLang="zh-CN" dirty="0" smtClean="0"/>
+          </a:p>
+        </p:txBody>
+      </p:sp>
+    </p:spTree>
+    <p:extLst>
+      <p:ext uri="{BB962C8B-B14F-4D97-AF65-F5344CB8AC3E}">
+        <p14:creationId xmlns:p14="http://schemas.microsoft.com/office/powerpoint/2010/main" val="1933232329"/>
+      </p:ext>
+    </p:extLst>
+  </p:cSld>
+  <p:clrMapOvr>
+    <a:masterClrMapping/>
+  </p:clrMapOvr>
+  <p:timing>
+    <p:tnLst>
+      <p:par>
+        <p:cTn id="1" dur="indefinite" restart="never" nodeType="tmRoot"/>
+      </p:par>
+    </p:tnLst>
+  </p:timing>
+</p:sld>
+</file>
+
+<file path=ppt/slides/slide12.xml><?xml version="1.0" encoding="utf-8"?>
+<p:sld xmlns:a="http://schemas.openxmlformats.org/drawingml/2006/main" xmlns:r="http://schemas.openxmlformats.org/officeDocument/2006/relationships" xmlns:p="http://schemas.openxmlformats.org/presentationml/2006/main">
+  <p:cSld>
+    <p:spTree>
+      <p:nvGrpSpPr>
+        <p:cNvPr id="1" name=""/>
+        <p:cNvGrpSpPr/>
+        <p:nvPr/>
+      </p:nvGrpSpPr>
+      <p:grpSpPr>
+        <a:xfrm>
+          <a:off x="0" y="0"/>
+          <a:ext cx="0" cy="0"/>
+          <a:chOff x="0" y="0"/>
+          <a:chExt cx="0" cy="0"/>
+        </a:xfrm>
+      </p:grpSpPr>
+      <p:sp>
+        <p:nvSpPr>
+          <p:cNvPr id="3" name="内容占位符 2"/>
+          <p:cNvSpPr>
+            <a:spLocks noGrp="1"/>
+          </p:cNvSpPr>
+          <p:nvPr>
+            <p:ph idx="1"/>
+          </p:nvPr>
+        </p:nvSpPr>
+        <p:spPr>
+          <a:xfrm>
+            <a:off x="457200" y="404664"/>
+            <a:ext cx="8229600" cy="5721499"/>
+          </a:xfrm>
+        </p:spPr>
+        <p:txBody>
+          <a:bodyPr/>
+          <a:lstStyle/>
+          <a:p>
+            <a:pPr marL="0" indent="0">
+              <a:buNone/>
+            </a:pPr>
+            <a:r>
+              <a:rPr lang="en-US" altLang="zh-CN" sz="2000" dirty="0"/>
+              <a:t>2</a:t>
+            </a:r>
+            <a:r>
+              <a:rPr lang="zh-CN" altLang="en-US" sz="2000" dirty="0"/>
+              <a:t>、 </a:t>
+            </a:r>
+            <a:r>
+              <a:rPr lang="en-US" altLang="zh-CN" sz="2000" dirty="0" err="1"/>
+              <a:t>flatmap</a:t>
+            </a:r>
+            <a:endParaRPr lang="en-US" altLang="zh-CN" sz="2000" dirty="0"/>
+          </a:p>
+          <a:p>
+            <a:pPr marL="0" indent="0">
+              <a:buNone/>
+            </a:pPr>
+            <a:r>
+              <a:rPr lang="en-US" altLang="zh-CN" sz="2000" dirty="0"/>
+              <a:t>      </a:t>
+            </a:r>
+            <a:r>
+              <a:rPr lang="zh-CN" altLang="en-US" sz="2000" dirty="0"/>
+              <a:t>一对多的变换，返回结果是</a:t>
+            </a:r>
+            <a:r>
+              <a:rPr lang="en-US" altLang="zh-CN" sz="2000" dirty="0"/>
+              <a:t>Observable</a:t>
+            </a:r>
+            <a:r>
+              <a:rPr lang="zh-CN" altLang="en-US" sz="2000" dirty="0"/>
+              <a:t>对象，不直接传递给</a:t>
+            </a:r>
+            <a:r>
+              <a:rPr lang="en-US" altLang="zh-CN" sz="2000" dirty="0"/>
+              <a:t>Subscriber</a:t>
+            </a:r>
+            <a:r>
+              <a:rPr lang="zh-CN" altLang="en-US" sz="2000" dirty="0"/>
+              <a:t>，而是通知上层的</a:t>
+            </a:r>
+            <a:r>
+              <a:rPr lang="en-US" altLang="zh-CN" sz="2000" dirty="0"/>
+              <a:t>Observable</a:t>
+            </a:r>
+            <a:r>
+              <a:rPr lang="zh-CN" altLang="en-US" sz="2000" dirty="0"/>
+              <a:t>，统一发送通知。</a:t>
+            </a:r>
+            <a:r>
+              <a:rPr lang="en-US" altLang="zh-CN" sz="2000" dirty="0"/>
+              <a:t>   </a:t>
+            </a:r>
+            <a:endParaRPr lang="en-US" altLang="zh-CN" sz="2000" dirty="0" smtClean="0"/>
+          </a:p>
+          <a:p>
+            <a:pPr marL="0" indent="0">
+              <a:buNone/>
+            </a:pPr>
+            <a:r>
+              <a:rPr lang="en-US" altLang="zh-CN" sz="2000" dirty="0" smtClean="0"/>
+              <a:t>3</a:t>
+            </a:r>
+            <a:r>
+              <a:rPr lang="zh-CN" altLang="en-US" sz="2000" dirty="0" smtClean="0"/>
+              <a:t>、</a:t>
+            </a:r>
+            <a:r>
+              <a:rPr lang="en-US" altLang="zh-CN" sz="2000" dirty="0" smtClean="0"/>
+              <a:t>lift</a:t>
+            </a:r>
+          </a:p>
+          <a:p>
+            <a:pPr marL="0" indent="0">
+              <a:buNone/>
+            </a:pPr>
+            <a:r>
+              <a:rPr lang="en-US" altLang="zh-CN" sz="2000" dirty="0"/>
+              <a:t> </a:t>
+            </a:r>
+            <a:r>
+              <a:rPr lang="en-US" altLang="zh-CN" sz="2000" dirty="0" smtClean="0"/>
+              <a:t>     </a:t>
+            </a:r>
+            <a:r>
+              <a:rPr lang="zh-CN" altLang="en-US" sz="2000" dirty="0" smtClean="0"/>
+              <a:t>在</a:t>
+            </a:r>
+            <a:r>
+              <a:rPr lang="en-US" altLang="zh-CN" sz="2000" dirty="0" smtClean="0"/>
+              <a:t>Observable</a:t>
+            </a:r>
+            <a:r>
+              <a:rPr lang="zh-CN" altLang="en-US" sz="2000" dirty="0" smtClean="0"/>
+              <a:t>执行了</a:t>
+            </a:r>
+            <a:r>
+              <a:rPr lang="en-US" altLang="zh-CN" sz="2000" dirty="0" smtClean="0"/>
+              <a:t>lift</a:t>
+            </a:r>
+            <a:r>
+              <a:rPr lang="zh-CN" altLang="en-US" sz="2000" dirty="0" smtClean="0"/>
+              <a:t>（</a:t>
+            </a:r>
+            <a:r>
+              <a:rPr lang="en-US" altLang="zh-CN" sz="2000" dirty="0" smtClean="0"/>
+              <a:t>Operator</a:t>
+            </a:r>
+            <a:r>
+              <a:rPr lang="zh-CN" altLang="en-US" sz="2000" dirty="0" smtClean="0"/>
+              <a:t>）方法之后，会返回一个新的</a:t>
+            </a:r>
+            <a:r>
+              <a:rPr lang="en-US" altLang="zh-CN" sz="2000" dirty="0" smtClean="0"/>
+              <a:t>Observable</a:t>
+            </a:r>
+            <a:r>
+              <a:rPr lang="zh-CN" altLang="en-US" sz="2000" dirty="0" smtClean="0"/>
+              <a:t>，这个新的</a:t>
+            </a:r>
+            <a:r>
+              <a:rPr lang="en-US" altLang="zh-CN" sz="2000" dirty="0" smtClean="0"/>
+              <a:t>Observable</a:t>
+            </a:r>
+            <a:r>
+              <a:rPr lang="zh-CN" altLang="en-US" sz="2000" dirty="0" smtClean="0"/>
+              <a:t>会像一个代理一样，负责接收原始的</a:t>
+            </a:r>
+            <a:r>
+              <a:rPr lang="en-US" altLang="zh-CN" sz="2000" dirty="0" smtClean="0"/>
+              <a:t>Observable</a:t>
+            </a:r>
+            <a:r>
+              <a:rPr lang="zh-CN" altLang="en-US" sz="2000" dirty="0" smtClean="0"/>
+              <a:t>发出的事件，并在处理后发送给</a:t>
+            </a:r>
+            <a:r>
+              <a:rPr lang="en-US" altLang="zh-CN" sz="2000" dirty="0" smtClean="0"/>
+              <a:t>Subscriber</a:t>
+            </a:r>
+            <a:r>
+              <a:rPr lang="zh-CN" altLang="en-US" sz="2000" dirty="0" smtClean="0"/>
+              <a:t>。</a:t>
+            </a:r>
+            <a:endParaRPr lang="en-US" altLang="zh-CN" sz="2000" dirty="0"/>
+          </a:p>
+          <a:p>
+            <a:pPr marL="0" indent="0">
+              <a:buNone/>
+            </a:pPr>
+            <a:endParaRPr lang="zh-CN" altLang="en-US" dirty="0"/>
+          </a:p>
+        </p:txBody>
+      </p:sp>
+      <p:pic>
+        <p:nvPicPr>
+          <p:cNvPr id="4" name="图片 3"/>
+          <p:cNvPicPr>
+            <a:picLocks noChangeAspect="1"/>
+          </p:cNvPicPr>
+          <p:nvPr/>
+        </p:nvPicPr>
+        <p:blipFill>
+          <a:blip r:embed="rId2">
+            <a:extLst>
+              <a:ext uri="{28A0092B-C50C-407E-A947-70E740481C1C}">
+                <a14:useLocalDpi xmlns:a14="http://schemas.microsoft.com/office/drawing/2010/main" val="0"/>
+              </a:ext>
+            </a:extLst>
+          </a:blip>
+          <a:stretch>
+            <a:fillRect/>
+          </a:stretch>
+        </p:blipFill>
+        <p:spPr>
+          <a:xfrm>
+            <a:off x="971600" y="2780928"/>
+            <a:ext cx="3721025" cy="3829932"/>
+          </a:xfrm>
+          <a:prstGeom prst="rect">
+            <a:avLst/>
+          </a:prstGeom>
+        </p:spPr>
+      </p:pic>
+      <p:sp>
+        <p:nvSpPr>
+          <p:cNvPr id="5" name="TextBox 4"/>
+          <p:cNvSpPr txBox="1"/>
+          <p:nvPr/>
+        </p:nvSpPr>
+        <p:spPr>
+          <a:xfrm>
+            <a:off x="5796136" y="4293096"/>
+            <a:ext cx="2411238" cy="369332"/>
+          </a:xfrm>
+          <a:prstGeom prst="rect">
+            <a:avLst/>
+          </a:prstGeom>
+          <a:noFill/>
+        </p:spPr>
+        <p:txBody>
+          <a:bodyPr wrap="none" rtlCol="0">
+            <a:spAutoFit/>
+          </a:bodyPr>
+          <a:lstStyle/>
+          <a:p>
+            <a:r>
+              <a:rPr lang="zh-CN" altLang="en-US" dirty="0" smtClean="0"/>
+              <a:t>图</a:t>
+            </a:r>
+            <a:r>
+              <a:rPr lang="en-US" altLang="zh-CN" dirty="0" smtClean="0"/>
+              <a:t>1-3 </a:t>
+            </a:r>
+            <a:r>
+              <a:rPr lang="zh-CN" altLang="en-US" dirty="0" smtClean="0"/>
+              <a:t>多个</a:t>
+            </a:r>
+            <a:r>
+              <a:rPr lang="en-US" altLang="zh-CN" dirty="0" smtClean="0"/>
+              <a:t>lift</a:t>
+            </a:r>
+            <a:r>
+              <a:rPr lang="zh-CN" altLang="en-US" dirty="0" smtClean="0"/>
+              <a:t>的效果图</a:t>
+            </a:r>
+            <a:endParaRPr lang="zh-CN" altLang="en-US" dirty="0"/>
+          </a:p>
+        </p:txBody>
+      </p:sp>
+    </p:spTree>
+    <p:extLst>
+      <p:ext uri="{BB962C8B-B14F-4D97-AF65-F5344CB8AC3E}">
+        <p14:creationId xmlns:p14="http://schemas.microsoft.com/office/powerpoint/2010/main" val="2544865338"/>
+      </p:ext>
+    </p:extLst>
+  </p:cSld>
+  <p:clrMapOvr>
+    <a:masterClrMapping/>
+  </p:clrMapOvr>
+  <p:timing>
+    <p:tnLst>
+      <p:par>
+        <p:cTn id="1" dur="indefinite" restart="never" nodeType="tmRoot"/>
+      </p:par>
+    </p:tnLst>
+  </p:timing>
+</p:sld>
+</file>
+
+<file path=ppt/slides/slide13.xml><?xml version="1.0" encoding="utf-8"?>
+<p:sld xmlns:a="http://schemas.openxmlformats.org/drawingml/2006/main" xmlns:r="http://schemas.openxmlformats.org/officeDocument/2006/relationships" xmlns:p="http://schemas.openxmlformats.org/presentationml/2006/main">
+  <p:cSld>
+    <p:spTree>
+      <p:nvGrpSpPr>
+        <p:cNvPr id="1" name=""/>
+        <p:cNvGrpSpPr/>
+        <p:nvPr/>
+      </p:nvGrpSpPr>
+      <p:grpSpPr>
+        <a:xfrm>
+          <a:off x="0" y="0"/>
+          <a:ext cx="0" cy="0"/>
+          <a:chOff x="0" y="0"/>
+          <a:chExt cx="0" cy="0"/>
+        </a:xfrm>
+      </p:grpSpPr>
+      <p:sp>
+        <p:nvSpPr>
+          <p:cNvPr id="2" name="标题 1"/>
+          <p:cNvSpPr>
+            <a:spLocks noGrp="1"/>
+          </p:cNvSpPr>
+          <p:nvPr>
+            <p:ph type="title"/>
+          </p:nvPr>
+        </p:nvSpPr>
+        <p:spPr/>
+        <p:txBody>
+          <a:bodyPr/>
+          <a:lstStyle/>
+          <a:p>
+            <a:r>
+              <a:rPr lang="zh-CN" altLang="en-US" dirty="0" smtClean="0"/>
+              <a:t>附录 </a:t>
+            </a:r>
+            <a:r>
+              <a:rPr lang="en-US" altLang="zh-CN" dirty="0" smtClean="0"/>
+              <a:t>– </a:t>
+            </a:r>
+            <a:r>
+              <a:rPr lang="zh-CN" altLang="en-US" dirty="0" smtClean="0"/>
+              <a:t>疑问点</a:t>
+            </a:r>
+            <a:endParaRPr lang="zh-CN" altLang="en-US" dirty="0"/>
+          </a:p>
+        </p:txBody>
+      </p:sp>
+      <p:sp>
+        <p:nvSpPr>
+          <p:cNvPr id="3" name="内容占位符 2"/>
+          <p:cNvSpPr>
+            <a:spLocks noGrp="1"/>
+          </p:cNvSpPr>
+          <p:nvPr>
+            <p:ph idx="1"/>
+          </p:nvPr>
+        </p:nvSpPr>
+        <p:spPr/>
+        <p:txBody>
+          <a:bodyPr>
+            <a:normAutofit/>
+          </a:bodyPr>
+          <a:lstStyle/>
+          <a:p>
+            <a:r>
+              <a:rPr lang="zh-CN" altLang="en-US" sz="2000" dirty="0" smtClean="0"/>
+              <a:t>问题</a:t>
+            </a:r>
+            <a:r>
+              <a:rPr lang="en-US" altLang="zh-CN" sz="2000" dirty="0" smtClean="0"/>
+              <a:t>1: subscribe</a:t>
+            </a:r>
+            <a:r>
+              <a:rPr lang="en-US" altLang="zh-CN" sz="2000" dirty="0"/>
+              <a:t>() </a:t>
+            </a:r>
+            <a:r>
+              <a:rPr lang="zh-CN" altLang="en-US" sz="2000" dirty="0"/>
+              <a:t>这个方法有点怪：它看起来是</a:t>
+            </a:r>
+            <a:r>
+              <a:rPr lang="en-US" altLang="zh-CN" sz="2000" dirty="0"/>
+              <a:t>『</a:t>
+            </a:r>
+            <a:r>
+              <a:rPr lang="en-US" altLang="zh-CN" sz="2000" dirty="0" err="1"/>
+              <a:t>observalbe</a:t>
+            </a:r>
+            <a:r>
+              <a:rPr lang="en-US" altLang="zh-CN" sz="2000" dirty="0"/>
+              <a:t> </a:t>
+            </a:r>
+            <a:r>
+              <a:rPr lang="zh-CN" altLang="en-US" sz="2000" dirty="0"/>
+              <a:t>订阅了 </a:t>
+            </a:r>
+            <a:r>
+              <a:rPr lang="en-US" altLang="zh-CN" sz="2000" dirty="0"/>
+              <a:t>observer / subscriber』</a:t>
+            </a:r>
+            <a:r>
+              <a:rPr lang="zh-CN" altLang="en-US" sz="2000" dirty="0"/>
+              <a:t>而不是</a:t>
+            </a:r>
+            <a:r>
+              <a:rPr lang="en-US" altLang="zh-CN" sz="2000" dirty="0"/>
+              <a:t>『observer / subscriber </a:t>
+            </a:r>
+            <a:r>
+              <a:rPr lang="zh-CN" altLang="en-US" sz="2000" dirty="0"/>
+              <a:t>订阅了 </a:t>
+            </a:r>
+            <a:r>
+              <a:rPr lang="en-US" altLang="zh-CN" sz="2000" dirty="0" err="1"/>
+              <a:t>observalbe</a:t>
+            </a:r>
+            <a:r>
+              <a:rPr lang="en-US" altLang="zh-CN" sz="2000" dirty="0"/>
+              <a:t>』</a:t>
+            </a:r>
+            <a:r>
+              <a:rPr lang="zh-CN" altLang="en-US" sz="2000" dirty="0"/>
+              <a:t>，这看起来就像</a:t>
+            </a:r>
+            <a:r>
+              <a:rPr lang="en-US" altLang="zh-CN" sz="2000" dirty="0"/>
+              <a:t>『</a:t>
+            </a:r>
+            <a:r>
+              <a:rPr lang="zh-CN" altLang="en-US" sz="2000" dirty="0"/>
+              <a:t>杂志订阅了读者</a:t>
+            </a:r>
+            <a:r>
+              <a:rPr lang="en-US" altLang="zh-CN" sz="2000" dirty="0"/>
+              <a:t>』</a:t>
+            </a:r>
+            <a:r>
+              <a:rPr lang="zh-CN" altLang="en-US" sz="2000" dirty="0"/>
+              <a:t>一样颠倒了对象关系。这让人读起来有点别扭，不过如果把 </a:t>
+            </a:r>
+            <a:r>
+              <a:rPr lang="en-US" altLang="zh-CN" sz="2000" dirty="0"/>
+              <a:t>API </a:t>
+            </a:r>
+            <a:r>
+              <a:rPr lang="zh-CN" altLang="en-US" sz="2000" dirty="0"/>
+              <a:t>设计成 </a:t>
+            </a:r>
+            <a:r>
+              <a:rPr lang="en-US" altLang="zh-CN" sz="2000" dirty="0" err="1"/>
+              <a:t>observer.subscribe</a:t>
+            </a:r>
+            <a:r>
+              <a:rPr lang="en-US" altLang="zh-CN" sz="2000" dirty="0"/>
+              <a:t>(observable) / </a:t>
+            </a:r>
+            <a:r>
+              <a:rPr lang="en-US" altLang="zh-CN" sz="2000" dirty="0" err="1"/>
+              <a:t>subscriber.subscribe</a:t>
+            </a:r>
+            <a:r>
+              <a:rPr lang="en-US" altLang="zh-CN" sz="2000" dirty="0"/>
+              <a:t>(observable) </a:t>
+            </a:r>
+            <a:r>
+              <a:rPr lang="zh-CN" altLang="en-US" sz="2000" dirty="0"/>
+              <a:t>，虽然更加符合思维逻辑，但对流式 </a:t>
+            </a:r>
+            <a:r>
+              <a:rPr lang="en-US" altLang="zh-CN" sz="2000" dirty="0"/>
+              <a:t>API </a:t>
+            </a:r>
+            <a:r>
+              <a:rPr lang="zh-CN" altLang="en-US" sz="2000" dirty="0"/>
+              <a:t>的设计就造成影响了，比较起来明显是得不偿失的</a:t>
+            </a:r>
+            <a:r>
+              <a:rPr lang="zh-CN" altLang="en-US" sz="2000" dirty="0" smtClean="0"/>
+              <a:t>。</a:t>
+            </a:r>
+            <a:endParaRPr lang="en-US" altLang="zh-CN" sz="2000" dirty="0" smtClean="0"/>
+          </a:p>
+          <a:p>
+            <a:r>
+              <a:rPr lang="zh-CN" altLang="en-US" sz="2000" dirty="0" smtClean="0"/>
+              <a:t>问题</a:t>
+            </a:r>
+            <a:r>
+              <a:rPr lang="en-US" altLang="zh-CN" sz="2000" dirty="0" smtClean="0"/>
+              <a:t>2</a:t>
+            </a:r>
+            <a:r>
+              <a:rPr lang="zh-CN" altLang="en-US" sz="2000" dirty="0" smtClean="0"/>
+              <a:t>：</a:t>
+            </a:r>
+            <a:r>
+              <a:rPr lang="en-US" altLang="zh-CN" sz="2000" dirty="0" err="1" smtClean="0"/>
               <a:t>onSubscribeStart</a:t>
             </a:r>
             <a:r>
-              <a:rPr lang="en-US" altLang="zh-CN" sz="2400" dirty="0" smtClean="0"/>
+              <a:rPr lang="en-US" altLang="zh-CN" sz="2000" dirty="0" smtClean="0"/>
               <a:t> </a:t>
             </a:r>
             <a:r>
-              <a:rPr lang="zh-CN" altLang="en-US" sz="2400" dirty="0" smtClean="0"/>
+              <a:rPr lang="zh-CN" altLang="en-US" sz="2000" dirty="0" smtClean="0"/>
               <a:t>这个方法，只需要传</a:t>
             </a:r>
             <a:r>
-              <a:rPr lang="en-US" altLang="zh-CN" sz="2400" dirty="0" err="1" smtClean="0"/>
+              <a:rPr lang="en-US" altLang="zh-CN" sz="2000" dirty="0" err="1" smtClean="0"/>
               <a:t>onSubscribe</a:t>
             </a:r>
             <a:r>
-              <a:rPr lang="zh-CN" altLang="en-US" sz="2400" dirty="0" smtClean="0"/>
-              <a:t>就可以了。</a:t>
-            </a:r>
-            <a:endParaRPr lang="en-US" altLang="zh-CN" sz="2400" dirty="0" smtClean="0"/>
-          </a:p>
-          <a:p>
-            <a:pPr marL="0" indent="0">
-              <a:buNone/>
-            </a:pPr>
-            <a:r>
-              <a:rPr lang="zh-CN" altLang="en-US" sz="2400" dirty="0" smtClean="0"/>
-              <a:t>其实是对它的包装可以在这里写，也许会需要用到被观察者对象。</a:t>
-            </a:r>
-            <a:endParaRPr lang="zh-CN" altLang="en-US" sz="2400" dirty="0"/>
+              <a:rPr lang="zh-CN" altLang="en-US" sz="2000" dirty="0" smtClean="0"/>
+              <a:t>就可以了</a:t>
+            </a:r>
+            <a:r>
+              <a:rPr lang="zh-CN" altLang="en-US" sz="2000" dirty="0" smtClean="0"/>
+              <a:t>。其实</a:t>
+            </a:r>
+            <a:r>
+              <a:rPr lang="zh-CN" altLang="en-US" sz="2000" dirty="0" smtClean="0"/>
+              <a:t>是对它的包装可以在这里写，也许会需要用到被观察者对象。</a:t>
+            </a:r>
+            <a:endParaRPr lang="zh-CN" altLang="en-US" sz="2000" dirty="0"/>
           </a:p>
         </p:txBody>
       </p:sp>
@@ -3395,6 +4063,187 @@
     <p:extLst>
       <p:ext uri="{BB962C8B-B14F-4D97-AF65-F5344CB8AC3E}">
         <p14:creationId xmlns:p14="http://schemas.microsoft.com/office/powerpoint/2010/main" val="4135835258"/>
+      </p:ext>
+    </p:extLst>
+  </p:cSld>
+  <p:clrMapOvr>
+    <a:masterClrMapping/>
+  </p:clrMapOvr>
+  <p:timing>
+    <p:tnLst>
+      <p:par>
+        <p:cTn id="1" dur="indefinite" restart="never" nodeType="tmRoot"/>
+      </p:par>
+    </p:tnLst>
+  </p:timing>
+</p:sld>
+</file>
+
+<file path=ppt/slides/slide14.xml><?xml version="1.0" encoding="utf-8"?>
+<p:sld xmlns:a="http://schemas.openxmlformats.org/drawingml/2006/main" xmlns:r="http://schemas.openxmlformats.org/officeDocument/2006/relationships" xmlns:p="http://schemas.openxmlformats.org/presentationml/2006/main">
+  <p:cSld>
+    <p:spTree>
+      <p:nvGrpSpPr>
+        <p:cNvPr id="1" name=""/>
+        <p:cNvGrpSpPr/>
+        <p:nvPr/>
+      </p:nvGrpSpPr>
+      <p:grpSpPr>
+        <a:xfrm>
+          <a:off x="0" y="0"/>
+          <a:ext cx="0" cy="0"/>
+          <a:chOff x="0" y="0"/>
+          <a:chExt cx="0" cy="0"/>
+        </a:xfrm>
+      </p:grpSpPr>
+      <p:sp>
+        <p:nvSpPr>
+          <p:cNvPr id="3" name="内容占位符 2"/>
+          <p:cNvSpPr>
+            <a:spLocks noGrp="1"/>
+          </p:cNvSpPr>
+          <p:nvPr>
+            <p:ph idx="1"/>
+          </p:nvPr>
+        </p:nvSpPr>
+        <p:spPr>
+          <a:xfrm>
+            <a:off x="457200" y="476672"/>
+            <a:ext cx="8229600" cy="5649491"/>
+          </a:xfrm>
+        </p:spPr>
+        <p:txBody>
+          <a:bodyPr>
+            <a:normAutofit/>
+          </a:bodyPr>
+          <a:lstStyle/>
+          <a:p>
+            <a:r>
+              <a:rPr lang="zh-CN" altLang="en-US" sz="2400" dirty="0" smtClean="0"/>
+              <a:t>问题</a:t>
+            </a:r>
+            <a:r>
+              <a:rPr lang="en-US" altLang="zh-CN" sz="2400" dirty="0" smtClean="0"/>
+              <a:t>3 </a:t>
+            </a:r>
+            <a:r>
+              <a:rPr lang="zh-CN" altLang="en-US" sz="2400" dirty="0" smtClean="0"/>
+              <a:t>：在学生课程的例子里，是否能即打印出学生的学生的姓名，又打印出学生对应的课程。（用</a:t>
+            </a:r>
+            <a:r>
+              <a:rPr lang="en-US" altLang="zh-CN" sz="2400" dirty="0" err="1" smtClean="0"/>
+              <a:t>flatmap</a:t>
+            </a:r>
+            <a:r>
+              <a:rPr lang="zh-CN" altLang="en-US" sz="2400" dirty="0" smtClean="0"/>
+              <a:t>实现）</a:t>
+            </a:r>
+            <a:endParaRPr lang="en-US" altLang="zh-CN" sz="2400" dirty="0" smtClean="0"/>
+          </a:p>
+          <a:p>
+            <a:pPr marL="0" indent="0">
+              <a:buNone/>
+            </a:pPr>
+            <a:r>
+              <a:rPr lang="en-US" altLang="zh-CN" sz="2400" dirty="0"/>
+              <a:t>      </a:t>
+            </a:r>
+            <a:r>
+              <a:rPr lang="en-US" altLang="zh-CN" sz="2400" dirty="0">
+                <a:hlinkClick r:id="rId2"/>
+              </a:rPr>
+              <a:t>https://</a:t>
+            </a:r>
+            <a:r>
+              <a:rPr lang="en-US" altLang="zh-CN" sz="2400" dirty="0" smtClean="0">
+                <a:hlinkClick r:id="rId2"/>
+              </a:rPr>
+              <a:t>github.com/ReactiveX/RxJava/issues/3013</a:t>
+            </a:r>
+            <a:r>
+              <a:rPr lang="en-US" altLang="zh-CN" sz="2400" dirty="0" smtClean="0"/>
+              <a:t>,</a:t>
+            </a:r>
+            <a:r>
+              <a:rPr lang="zh-CN" altLang="en-US" sz="2400" dirty="0" smtClean="0"/>
+              <a:t>解释</a:t>
+            </a:r>
+            <a:endParaRPr lang="en-US" altLang="zh-CN" sz="2400" dirty="0" smtClean="0"/>
+          </a:p>
+          <a:p>
+            <a:pPr marL="0" indent="0">
+              <a:buNone/>
+            </a:pPr>
+            <a:endParaRPr lang="en-US" altLang="zh-CN" sz="2400" dirty="0"/>
+          </a:p>
+          <a:p>
+            <a:r>
+              <a:rPr lang="zh-CN" altLang="en-US" sz="2400" dirty="0" smtClean="0"/>
+              <a:t>问题</a:t>
+            </a:r>
+            <a:r>
+              <a:rPr lang="en-US" altLang="zh-CN" sz="2400" dirty="0"/>
+              <a:t>4</a:t>
+            </a:r>
+            <a:r>
+              <a:rPr lang="zh-CN" altLang="en-US" sz="2400" dirty="0" smtClean="0"/>
+              <a:t>：</a:t>
+            </a:r>
+            <a:r>
+              <a:rPr lang="en-US" altLang="zh-CN" sz="2400" dirty="0"/>
+              <a:t>Implementing Your Own Operators</a:t>
+            </a:r>
+          </a:p>
+          <a:p>
+            <a:pPr marL="0" indent="0">
+              <a:buNone/>
+            </a:pPr>
+            <a:r>
+              <a:rPr lang="en-US" altLang="zh-CN" sz="2400" dirty="0"/>
+              <a:t>      </a:t>
+            </a:r>
+            <a:r>
+              <a:rPr lang="en-US" altLang="zh-CN" sz="2400" dirty="0">
+                <a:hlinkClick r:id="rId3"/>
+              </a:rPr>
+              <a:t>https://</a:t>
+            </a:r>
+            <a:r>
+              <a:rPr lang="en-US" altLang="zh-CN" sz="2400" dirty="0" smtClean="0">
+                <a:hlinkClick r:id="rId3"/>
+              </a:rPr>
+              <a:t>github.com/ReactiveX/RxJava/wiki/Implementing-Your-Own-Operators</a:t>
+            </a:r>
+            <a:r>
+              <a:rPr lang="en-US" altLang="zh-CN" sz="2400" dirty="0" smtClean="0"/>
+              <a:t> </a:t>
+            </a:r>
+            <a:endParaRPr lang="en-US" altLang="zh-CN" sz="2400" dirty="0"/>
+          </a:p>
+          <a:p>
+            <a:pPr marL="0" indent="0">
+              <a:buNone/>
+            </a:pPr>
+            <a:endParaRPr lang="en-US" altLang="zh-CN" sz="2400" dirty="0" smtClean="0"/>
+          </a:p>
+          <a:p>
+            <a:pPr marL="0" indent="0">
+              <a:buNone/>
+            </a:pPr>
+            <a:endParaRPr lang="en-US" altLang="zh-CN" sz="2400" dirty="0" smtClean="0"/>
+          </a:p>
+          <a:p>
+            <a:pPr marL="0" indent="0">
+              <a:buNone/>
+            </a:pPr>
+            <a:endParaRPr lang="zh-CN" altLang="en-US" sz="2400" dirty="0"/>
+          </a:p>
+        </p:txBody>
+      </p:sp>
+    </p:spTree>
+    <p:extLst>
+      <p:ext uri="{BB962C8B-B14F-4D97-AF65-F5344CB8AC3E}">
+        <p14:creationId xmlns:p14="http://schemas.microsoft.com/office/powerpoint/2010/main" val="3418726642"/>
       </p:ext>
     </p:extLst>
   </p:cSld>
@@ -3758,6 +4607,151 @@
       </p:grpSpPr>
       <p:sp>
         <p:nvSpPr>
+          <p:cNvPr id="3" name="内容占位符 2"/>
+          <p:cNvSpPr>
+            <a:spLocks noGrp="1"/>
+          </p:cNvSpPr>
+          <p:nvPr>
+            <p:ph idx="1"/>
+          </p:nvPr>
+        </p:nvSpPr>
+        <p:spPr>
+          <a:xfrm>
+            <a:off x="457200" y="404664"/>
+            <a:ext cx="8229600" cy="5721499"/>
+          </a:xfrm>
+        </p:spPr>
+        <p:txBody>
+          <a:bodyPr/>
+          <a:lstStyle/>
+          <a:p>
+            <a:r>
+              <a:rPr lang="zh-CN" altLang="en-US" dirty="0" smtClean="0"/>
+              <a:t>变换</a:t>
+            </a:r>
+            <a:endParaRPr lang="en-US" altLang="zh-CN" dirty="0" smtClean="0"/>
+          </a:p>
+          <a:p>
+            <a:pPr marL="0" indent="0">
+              <a:buNone/>
+            </a:pPr>
+            <a:r>
+              <a:rPr lang="en-US" altLang="zh-CN" sz="2400" dirty="0"/>
+              <a:t> </a:t>
+            </a:r>
+            <a:r>
+              <a:rPr lang="en-US" altLang="zh-CN" sz="2400" dirty="0" smtClean="0"/>
+              <a:t>    </a:t>
+            </a:r>
+            <a:r>
+              <a:rPr lang="zh-CN" altLang="en-US" sz="2400" dirty="0" smtClean="0"/>
+              <a:t>如省略了</a:t>
+            </a:r>
+            <a:r>
+              <a:rPr lang="en-US" altLang="zh-CN" sz="2400" dirty="0" smtClean="0"/>
+              <a:t>for</a:t>
+            </a:r>
+            <a:r>
+              <a:rPr lang="zh-CN" altLang="en-US" sz="2400" dirty="0" smtClean="0"/>
+              <a:t>循环，执行速度更快，原理使用迭代器。</a:t>
+            </a:r>
+            <a:endParaRPr lang="en-US" altLang="zh-CN" sz="2400" dirty="0" smtClean="0"/>
+          </a:p>
+          <a:p>
+            <a:pPr marL="0" indent="0">
+              <a:buNone/>
+            </a:pPr>
+            <a:endParaRPr lang="en-US" altLang="zh-CN" sz="2400" dirty="0"/>
+          </a:p>
+          <a:p>
+            <a:pPr lvl="0"/>
+            <a:r>
+              <a:rPr lang="zh-CN" altLang="en-US" dirty="0" smtClean="0">
+                <a:solidFill>
+                  <a:prstClr val="black"/>
+                </a:solidFill>
+              </a:rPr>
+              <a:t>线程调度 </a:t>
+            </a:r>
+            <a:endParaRPr lang="en-US" altLang="zh-CN" dirty="0" smtClean="0">
+              <a:solidFill>
+                <a:prstClr val="black"/>
+              </a:solidFill>
+            </a:endParaRPr>
+          </a:p>
+          <a:p>
+            <a:pPr marL="0" indent="0">
+              <a:buNone/>
+            </a:pPr>
+            <a:r>
+              <a:rPr lang="zh-CN" altLang="en-US" sz="2400" dirty="0" smtClean="0"/>
+              <a:t>     不用在使用</a:t>
+            </a:r>
+            <a:r>
+              <a:rPr lang="en-US" altLang="zh-CN" sz="2400" dirty="0" err="1"/>
+              <a:t>runOnUiThread</a:t>
+            </a:r>
+            <a:r>
+              <a:rPr lang="zh-CN" altLang="en-US" sz="2400" dirty="0" smtClean="0"/>
+              <a:t>、</a:t>
+            </a:r>
+            <a:r>
+              <a:rPr lang="en-US" altLang="zh-CN" sz="2400" dirty="0" smtClean="0"/>
+              <a:t>Handler</a:t>
+            </a:r>
+            <a:r>
+              <a:rPr lang="zh-CN" altLang="en-US" sz="2400" dirty="0" smtClean="0"/>
+              <a:t>等线程切换方式，一句话搞定线程调度。</a:t>
+            </a:r>
+            <a:endParaRPr lang="en-US" altLang="zh-CN" sz="2400" dirty="0"/>
+          </a:p>
+          <a:p>
+            <a:pPr marL="0" indent="0">
+              <a:buNone/>
+            </a:pPr>
+            <a:endParaRPr lang="zh-CN" altLang="en-US" sz="2400" dirty="0"/>
+          </a:p>
+        </p:txBody>
+      </p:sp>
+    </p:spTree>
+    <p:extLst>
+      <p:ext uri="{BB962C8B-B14F-4D97-AF65-F5344CB8AC3E}">
+        <p14:creationId xmlns:p14="http://schemas.microsoft.com/office/powerpoint/2010/main" val="2661425950"/>
+      </p:ext>
+    </p:extLst>
+  </p:cSld>
+  <p:clrMapOvr>
+    <a:masterClrMapping/>
+  </p:clrMapOvr>
+  <p:timing>
+    <p:tnLst>
+      <p:par>
+        <p:cTn id="1" dur="indefinite" restart="never" nodeType="tmRoot"/>
+      </p:par>
+    </p:tnLst>
+  </p:timing>
+</p:sld>
+</file>
+
+<file path=ppt/slides/slide5.xml><?xml version="1.0" encoding="utf-8"?>
+<p:sld xmlns:a="http://schemas.openxmlformats.org/drawingml/2006/main" xmlns:r="http://schemas.openxmlformats.org/officeDocument/2006/relationships" xmlns:p="http://schemas.openxmlformats.org/presentationml/2006/main">
+  <p:cSld>
+    <p:spTree>
+      <p:nvGrpSpPr>
+        <p:cNvPr id="1" name=""/>
+        <p:cNvGrpSpPr/>
+        <p:nvPr/>
+      </p:nvGrpSpPr>
+      <p:grpSpPr>
+        <a:xfrm>
+          <a:off x="0" y="0"/>
+          <a:ext cx="0" cy="0"/>
+          <a:chOff x="0" y="0"/>
+          <a:chExt cx="0" cy="0"/>
+        </a:xfrm>
+      </p:grpSpPr>
+      <p:sp>
+        <p:nvSpPr>
           <p:cNvPr id="2" name="标题 1"/>
           <p:cNvSpPr>
             <a:spLocks noGrp="1"/>
@@ -4364,7 +5358,7 @@
 </p:sld>
 </file>
 
-<file path=ppt/slides/slide5.xml><?xml version="1.0" encoding="utf-8"?>
+<file path=ppt/slides/slide6.xml><?xml version="1.0" encoding="utf-8"?>
 <p:sld xmlns:a="http://schemas.openxmlformats.org/drawingml/2006/main" xmlns:r="http://schemas.openxmlformats.org/officeDocument/2006/relationships" xmlns:p="http://schemas.openxmlformats.org/presentationml/2006/main">
   <p:cSld>
     <p:spTree>
@@ -4648,7 +5642,7 @@
 </p:sld>
 </file>
 
-<file path=ppt/slides/slide6.xml><?xml version="1.0" encoding="utf-8"?>
+<file path=ppt/slides/slide7.xml><?xml version="1.0" encoding="utf-8"?>
 <p:sld xmlns:a="http://schemas.openxmlformats.org/drawingml/2006/main" xmlns:r="http://schemas.openxmlformats.org/officeDocument/2006/relationships" xmlns:p="http://schemas.openxmlformats.org/presentationml/2006/main">
   <p:cSld>
     <p:spTree>
@@ -4821,112 +5815,6 @@
 </p:sld>
 </file>
 
-<file path=ppt/slides/slide7.xml><?xml version="1.0" encoding="utf-8"?>
-<p:sld xmlns:a="http://schemas.openxmlformats.org/drawingml/2006/main" xmlns:r="http://schemas.openxmlformats.org/officeDocument/2006/relationships" xmlns:p="http://schemas.openxmlformats.org/presentationml/2006/main">
-  <p:cSld>
-    <p:spTree>
-      <p:nvGrpSpPr>
-        <p:cNvPr id="1" name=""/>
-        <p:cNvGrpSpPr/>
-        <p:nvPr/>
-      </p:nvGrpSpPr>
-      <p:grpSpPr>
-        <a:xfrm>
-          <a:off x="0" y="0"/>
-          <a:ext cx="0" cy="0"/>
-          <a:chOff x="0" y="0"/>
-          <a:chExt cx="0" cy="0"/>
-        </a:xfrm>
-      </p:grpSpPr>
-      <p:sp>
-        <p:nvSpPr>
-          <p:cNvPr id="2" name="标题 1"/>
-          <p:cNvSpPr>
-            <a:spLocks noGrp="1"/>
-          </p:cNvSpPr>
-          <p:nvPr>
-            <p:ph type="title"/>
-          </p:nvPr>
-        </p:nvSpPr>
-        <p:spPr/>
-        <p:txBody>
-          <a:bodyPr/>
-          <a:lstStyle/>
-          <a:p>
-            <a:r>
-              <a:rPr lang="zh-CN" altLang="en-US" dirty="0" smtClean="0"/>
-              <a:t>五、线程控制</a:t>
-            </a:r>
-            <a:endParaRPr lang="zh-CN" altLang="en-US" dirty="0"/>
-          </a:p>
-        </p:txBody>
-      </p:sp>
-      <p:sp>
-        <p:nvSpPr>
-          <p:cNvPr id="3" name="内容占位符 2"/>
-          <p:cNvSpPr>
-            <a:spLocks noGrp="1"/>
-          </p:cNvSpPr>
-          <p:nvPr>
-            <p:ph idx="1"/>
-          </p:nvPr>
-        </p:nvSpPr>
-        <p:spPr/>
-        <p:txBody>
-          <a:bodyPr/>
-          <a:lstStyle/>
-          <a:p>
-            <a:r>
-              <a:rPr lang="en-US" altLang="zh-CN" dirty="0" smtClean="0"/>
-              <a:t>Scheduler – </a:t>
-            </a:r>
-            <a:r>
-              <a:rPr lang="zh-CN" altLang="en-US" dirty="0" smtClean="0"/>
-              <a:t>调度器</a:t>
-            </a:r>
-            <a:endParaRPr lang="en-US" altLang="zh-CN" dirty="0" smtClean="0"/>
-          </a:p>
-          <a:p>
-            <a:pPr marL="0" indent="0">
-              <a:buNone/>
-            </a:pPr>
-            <a:r>
-              <a:rPr lang="en-US" altLang="zh-CN" dirty="0"/>
-              <a:t> </a:t>
-            </a:r>
-            <a:r>
-              <a:rPr lang="en-US" altLang="zh-CN" dirty="0" smtClean="0"/>
-              <a:t>   </a:t>
-            </a:r>
-            <a:r>
-              <a:rPr lang="zh-CN" altLang="en-US" sz="2400" dirty="0" smtClean="0"/>
-              <a:t>切换事件生产和</a:t>
-            </a:r>
-            <a:r>
-              <a:rPr lang="zh-CN" altLang="en-US" sz="2400" smtClean="0"/>
-              <a:t>消费的所在线程</a:t>
-            </a:r>
-            <a:r>
-              <a:rPr lang="zh-CN" altLang="en-US" sz="2400" dirty="0" smtClean="0"/>
-              <a:t>。</a:t>
-            </a:r>
-            <a:endParaRPr lang="zh-CN" altLang="en-US" sz="2400" dirty="0"/>
-          </a:p>
-        </p:txBody>
-      </p:sp>
-    </p:spTree>
-    <p:extLst>
-      <p:ext uri="{BB962C8B-B14F-4D97-AF65-F5344CB8AC3E}">
-        <p14:creationId xmlns:p14="http://schemas.microsoft.com/office/powerpoint/2010/main" val="1748879821"/>
-      </p:ext>
-    </p:extLst>
-  </p:cSld>
-  <p:clrMapOvr>
-    <a:masterClrMapping/>
-  </p:clrMapOvr>
-</p:sld>
-</file>
-
 <file path=ppt/slides/slide8.xml><?xml version="1.0" encoding="utf-8"?>
 <p:sld xmlns:a="http://schemas.openxmlformats.org/drawingml/2006/main" xmlns:r="http://schemas.openxmlformats.org/officeDocument/2006/relationships" xmlns:p="http://schemas.openxmlformats.org/presentationml/2006/main">
   <p:cSld>
@@ -4956,14 +5844,12 @@
         </p:nvSpPr>
         <p:spPr/>
         <p:txBody>
-          <a:bodyPr>
-            <a:normAutofit/>
-          </a:bodyPr>
-          <a:lstStyle/>
-          <a:p>
-            <a:r>
-              <a:rPr lang="en-US" altLang="zh-CN" dirty="0" err="1" smtClean="0"/>
-              <a:t>RxAndroid</a:t>
+          <a:bodyPr/>
+          <a:lstStyle/>
+          <a:p>
+            <a:r>
+              <a:rPr lang="zh-CN" altLang="en-US" dirty="0" smtClean="0"/>
+              <a:t>五、线程控制</a:t>
             </a:r>
             <a:endParaRPr lang="zh-CN" altLang="en-US" dirty="0"/>
           </a:p>
@@ -4985,34 +5871,47 @@
           <a:lstStyle/>
           <a:p>
             <a:r>
+              <a:rPr lang="en-US" altLang="zh-CN" dirty="0" smtClean="0"/>
+              <a:t>Scheduler – </a:t>
+            </a:r>
+            <a:r>
+              <a:rPr lang="zh-CN" altLang="en-US" dirty="0" smtClean="0"/>
+              <a:t>调度器</a:t>
+            </a:r>
+            <a:endParaRPr lang="en-US" altLang="zh-CN" dirty="0" smtClean="0"/>
+          </a:p>
+          <a:p>
+            <a:pPr marL="0" indent="0">
+              <a:buNone/>
+            </a:pPr>
+            <a:r>
               <a:rPr lang="en-US" altLang="zh-CN" dirty="0"/>
-              <a:t>This module adds the minimum classes to </a:t>
-            </a:r>
-            <a:r>
-              <a:rPr lang="en-US" altLang="zh-CN" dirty="0" err="1"/>
-              <a:t>RxJava</a:t>
-            </a:r>
-            <a:r>
-              <a:rPr lang="en-US" altLang="zh-CN" dirty="0"/>
-              <a:t> that make writing reactive components in Android applications easy and hassle-free. More specifically, it provides a Scheduler that schedules on the main UI thread or any given Handler</a:t>
+              <a:t> </a:t>
             </a:r>
             <a:r>
               <a:rPr lang="en-US" altLang="zh-CN" dirty="0" smtClean="0"/>
-              <a:t>.</a:t>
-            </a:r>
-          </a:p>
-          <a:p>
-            <a:r>
-              <a:rPr lang="zh-CN" altLang="en-US" dirty="0"/>
-              <a:t>调度器</a:t>
-            </a:r>
+              <a:t>   </a:t>
+            </a:r>
+            <a:r>
+              <a:rPr lang="zh-CN" altLang="en-US" sz="2400" dirty="0" smtClean="0"/>
+              <a:t>切换事件生产和</a:t>
+            </a:r>
+            <a:r>
+              <a:rPr lang="zh-CN" altLang="en-US" sz="2400" smtClean="0"/>
+              <a:t>消费的所在线程</a:t>
+            </a:r>
+            <a:r>
+              <a:rPr lang="zh-CN" altLang="en-US" sz="2400" dirty="0" smtClean="0"/>
+              <a:t>。</a:t>
+            </a:r>
+            <a:endParaRPr lang="zh-CN" altLang="en-US" sz="2400" dirty="0"/>
           </a:p>
         </p:txBody>
       </p:sp>
     </p:spTree>
     <p:extLst>
       <p:ext uri="{BB962C8B-B14F-4D97-AF65-F5344CB8AC3E}">
-        <p14:creationId xmlns:p14="http://schemas.microsoft.com/office/powerpoint/2010/main" val="3100478039"/>
+        <p14:creationId xmlns:p14="http://schemas.microsoft.com/office/powerpoint/2010/main" val="1748879821"/>
       </p:ext>
     </p:extLst>
   </p:cSld>
@@ -5058,76 +5957,76 @@
         </p:nvSpPr>
         <p:spPr/>
         <p:txBody>
-          <a:bodyPr/>
-          <a:lstStyle/>
-          <a:p>
+          <a:bodyPr>
+            <a:normAutofit/>
+          </a:bodyPr>
+          <a:lstStyle/>
+          <a:p>
+            <a:r>
+              <a:rPr lang="en-US" altLang="zh-CN" dirty="0" err="1" smtClean="0"/>
+              <a:t>RxAndroid</a:t>
+            </a:r>
+            <a:endParaRPr lang="zh-CN" altLang="en-US" dirty="0"/>
+          </a:p>
+        </p:txBody>
+      </p:sp>
+      <p:sp>
+        <p:nvSpPr>
+          <p:cNvPr id="3" name="内容占位符 2"/>
+          <p:cNvSpPr>
+            <a:spLocks noGrp="1"/>
+          </p:cNvSpPr>
+          <p:nvPr>
+            <p:ph idx="1"/>
+          </p:nvPr>
+        </p:nvSpPr>
+        <p:spPr/>
+        <p:txBody>
+          <a:bodyPr/>
+          <a:lstStyle/>
+          <a:p>
+            <a:r>
+              <a:rPr lang="en-US" altLang="zh-CN" dirty="0"/>
+              <a:t>This module adds the minimum classes to </a:t>
+            </a:r>
+            <a:r>
+              <a:rPr lang="en-US" altLang="zh-CN" dirty="0" err="1"/>
+              <a:t>RxJava</a:t>
+            </a:r>
+            <a:r>
+              <a:rPr lang="en-US" altLang="zh-CN" dirty="0"/>
+              <a:t> that make writing reactive components in Android applications easy and hassle-free. More specifically, it provides a Scheduler that schedules on the main UI thread or any given Handler</a:t>
+            </a:r>
             <a:r>
               <a:rPr lang="en-US" altLang="zh-CN" dirty="0" smtClean="0"/>
-              <a:t>Scheduler</a:t>
-            </a:r>
-            <a:r>
-              <a:rPr lang="zh-CN" altLang="en-US" dirty="0" smtClean="0"/>
-              <a:t>的原理</a:t>
-            </a:r>
-            <a:endParaRPr lang="zh-CN" altLang="en-US" dirty="0"/>
-          </a:p>
-        </p:txBody>
-      </p:sp>
-      <p:sp>
-        <p:nvSpPr>
-          <p:cNvPr id="3" name="内容占位符 2"/>
-          <p:cNvSpPr>
-            <a:spLocks noGrp="1"/>
-          </p:cNvSpPr>
-          <p:nvPr>
-            <p:ph idx="1"/>
-          </p:nvPr>
-        </p:nvSpPr>
-        <p:spPr/>
-        <p:txBody>
-          <a:bodyPr/>
-          <a:lstStyle/>
-          <a:p>
-            <a:r>
-              <a:rPr lang="zh-CN" altLang="en-US" dirty="0" smtClean="0"/>
-              <a:t>一、变换</a:t>
-            </a:r>
-            <a:endParaRPr lang="en-US" altLang="zh-CN" dirty="0" smtClean="0"/>
-          </a:p>
-          <a:p>
-            <a:pPr marL="0" indent="0">
-              <a:buNone/>
-            </a:pPr>
-            <a:r>
-              <a:rPr lang="en-US" altLang="zh-CN" dirty="0"/>
-              <a:t> </a:t>
-            </a:r>
-            <a:r>
-              <a:rPr lang="en-US" altLang="zh-CN" dirty="0" smtClean="0"/>
-              <a:t>  </a:t>
-            </a:r>
-            <a:r>
-              <a:rPr lang="en-US" altLang="zh-CN" sz="2400" dirty="0" smtClean="0"/>
-              <a:t> </a:t>
-            </a:r>
-            <a:r>
-              <a:rPr lang="zh-CN" altLang="en-US" sz="2400" smtClean="0"/>
-              <a:t>将事件序列中的对象或整个事件序列进行加工处理，转换成不同是对象或事件序列。</a:t>
-            </a:r>
-            <a:endParaRPr lang="zh-CN" altLang="en-US" dirty="0"/>
+              <a:t>.</a:t>
+            </a:r>
+          </a:p>
+          <a:p>
+            <a:r>
+              <a:rPr lang="zh-CN" altLang="en-US" dirty="0"/>
+              <a:t>调度器</a:t>
+            </a:r>
           </a:p>
         </p:txBody>
       </p:sp>
     </p:spTree>
     <p:extLst>
       <p:ext uri="{BB962C8B-B14F-4D97-AF65-F5344CB8AC3E}">
-        <p14:creationId xmlns:p14="http://schemas.microsoft.com/office/powerpoint/2010/main" val="2507018378"/>
+        <p14:creationId xmlns:p14="http://schemas.microsoft.com/office/powerpoint/2010/main" val="3100478039"/>
       </p:ext>
     </p:extLst>
   </p:cSld>
   <p:clrMapOvr>
     <a:masterClrMapping/>
   </p:clrMapOvr>
+  <p:timing>
+    <p:tnLst>
+      <p:par>
+        <p:cTn id="1" dur="indefinite" restart="never" nodeType="tmRoot"/>
+      </p:par>
+    </p:tnLst>
+  </p:timing>
 </p:sld>
 </file>
 

</xml_diff>